<commit_message>
Adds screenshots and partial analysis slide
</commit_message>
<xml_diff>
--- a/MergeSortPresentation.pptx
+++ b/MergeSortPresentation.pptx
@@ -7,8 +7,9 @@
   <p:sldIdLst>
     <p:sldId id="256" r:id="rId2"/>
     <p:sldId id="257" r:id="rId3"/>
-    <p:sldId id="259" r:id="rId4"/>
-    <p:sldId id="260" r:id="rId5"/>
+    <p:sldId id="263" r:id="rId4"/>
+    <p:sldId id="261" r:id="rId5"/>
+    <p:sldId id="262" r:id="rId6"/>
   </p:sldIdLst>
   <p:sldSz cx="9144000" cy="6858000" type="screen4x3"/>
   <p:notesSz cx="6858000" cy="9144000"/>
@@ -3831,47 +3832,6 @@
               <a:t> in order</a:t>
             </a:r>
           </a:p>
-          <a:p>
-            <a:r>
-              <a:rPr lang="en-US" dirty="0"/>
-              <a:t>W</a:t>
-            </a:r>
-            <a:r>
-              <a:rPr lang="en-US" dirty="0" smtClean="0"/>
-              <a:t>orst </a:t>
-            </a:r>
-            <a:r>
-              <a:rPr lang="en-US" dirty="0"/>
-              <a:t>and a</a:t>
-            </a:r>
-            <a:r>
-              <a:rPr lang="en-US" dirty="0" smtClean="0"/>
-              <a:t>verage </a:t>
-            </a:r>
-            <a:r>
-              <a:rPr lang="en-US" dirty="0"/>
-              <a:t>case </a:t>
-            </a:r>
-            <a:r>
-              <a:rPr lang="en-US" dirty="0" smtClean="0"/>
-              <a:t>analysis: </a:t>
-            </a:r>
-            <a:r>
-              <a:rPr lang="en-US" dirty="0"/>
-              <a:t>O(</a:t>
-            </a:r>
-            <a:r>
-              <a:rPr lang="en-US" dirty="0" err="1"/>
-              <a:t>nlogn</a:t>
-            </a:r>
-            <a:r>
-              <a:rPr lang="en-US" dirty="0"/>
-              <a:t>)</a:t>
-            </a:r>
-          </a:p>
-          <a:p>
-            <a:endParaRPr lang="en-US" dirty="0" smtClean="0"/>
-          </a:p>
         </p:txBody>
       </p:sp>
     </p:spTree>
@@ -3928,7 +3888,7 @@
           <a:p>
             <a:r>
               <a:rPr lang="en-US" dirty="0" smtClean="0"/>
-              <a:t>Implementation</a:t>
+              <a:t>Analysis</a:t>
             </a:r>
             <a:endParaRPr lang="en-US" dirty="0"/>
           </a:p>
@@ -3949,27 +3909,34 @@
           <a:bodyPr/>
           <a:lstStyle/>
           <a:p>
-            <a:endParaRPr lang="en-US"/>
+            <a:r>
+              <a:rPr lang="en-US" dirty="0" smtClean="0"/>
+              <a:t>Worst and average case analysis: O(</a:t>
+            </a:r>
+            <a:r>
+              <a:rPr lang="en-US" dirty="0" err="1" smtClean="0"/>
+              <a:t>nlogn</a:t>
+            </a:r>
+            <a:r>
+              <a:rPr lang="en-US" smtClean="0"/>
+              <a:t>)</a:t>
+            </a:r>
+          </a:p>
+          <a:p>
+            <a:endParaRPr lang="en-US" dirty="0"/>
           </a:p>
         </p:txBody>
       </p:sp>
     </p:spTree>
     <p:extLst>
       <p:ext uri="{BB962C8B-B14F-4D97-AF65-F5344CB8AC3E}">
-        <p14:creationId xmlns:p14="http://schemas.microsoft.com/office/powerpoint/2010/main" val="1201823533"/>
+        <p14:creationId xmlns:p14="http://schemas.microsoft.com/office/powerpoint/2010/main" val="576862369"/>
       </p:ext>
     </p:extLst>
   </p:cSld>
   <p:clrMapOvr>
     <a:masterClrMapping/>
   </p:clrMapOvr>
-  <p:timing>
-    <p:tnLst>
-      <p:par>
-        <p:cTn xmlns:p14="http://schemas.microsoft.com/office/powerpoint/2010/main" id="1" dur="indefinite" restart="never" nodeType="tmRoot"/>
-      </p:par>
-    </p:tnLst>
-  </p:timing>
 </p:sld>
 </file>
 
@@ -4005,7 +3972,11 @@
           <a:bodyPr/>
           <a:lstStyle/>
           <a:p>
-            <a:endParaRPr lang="en-US"/>
+            <a:r>
+              <a:rPr lang="en-US" dirty="0" smtClean="0"/>
+              <a:t>Implementation</a:t>
+            </a:r>
+            <a:endParaRPr lang="en-US" dirty="0"/>
           </a:p>
         </p:txBody>
       </p:sp>
@@ -4024,14 +3995,202 @@
           <a:bodyPr/>
           <a:lstStyle/>
           <a:p>
-            <a:endParaRPr lang="en-US"/>
-          </a:p>
-        </p:txBody>
-      </p:sp>
+            <a:r>
+              <a:rPr lang="en-US" dirty="0" smtClean="0"/>
+              <a:t>Main Method:</a:t>
+            </a:r>
+          </a:p>
+          <a:p>
+            <a:pPr marL="0" indent="0">
+              <a:buNone/>
+            </a:pPr>
+            <a:endParaRPr lang="en-US" dirty="0"/>
+          </a:p>
+        </p:txBody>
+      </p:sp>
+      <p:pic>
+        <p:nvPicPr>
+          <p:cNvPr id="4" name="Picture 3"/>
+          <p:cNvPicPr>
+            <a:picLocks noChangeAspect="1"/>
+          </p:cNvPicPr>
+          <p:nvPr/>
+        </p:nvPicPr>
+        <p:blipFill rotWithShape="1">
+          <a:blip r:embed="rId2"/>
+          <a:srcRect l="20000" t="47332" r="20000" b="20668"/>
+          <a:stretch/>
+        </p:blipFill>
+        <p:spPr>
+          <a:xfrm>
+            <a:off x="137366" y="2352846"/>
+            <a:ext cx="8866093" cy="2659828"/>
+          </a:xfrm>
+          <a:prstGeom prst="rect">
+            <a:avLst/>
+          </a:prstGeom>
+        </p:spPr>
+      </p:pic>
     </p:spTree>
     <p:extLst>
       <p:ext uri="{BB962C8B-B14F-4D97-AF65-F5344CB8AC3E}">
-        <p14:creationId xmlns:p14="http://schemas.microsoft.com/office/powerpoint/2010/main" val="3050536011"/>
+        <p14:creationId xmlns:p14="http://schemas.microsoft.com/office/powerpoint/2010/main" val="2274116813"/>
+      </p:ext>
+    </p:extLst>
+  </p:cSld>
+  <p:clrMapOvr>
+    <a:masterClrMapping/>
+  </p:clrMapOvr>
+  <p:timing>
+    <p:tnLst>
+      <p:par>
+        <p:cTn xmlns:p14="http://schemas.microsoft.com/office/powerpoint/2010/main" id="1" dur="indefinite" restart="never" nodeType="tmRoot"/>
+      </p:par>
+    </p:tnLst>
+  </p:timing>
+</p:sld>
+</file>
+
+<file path=ppt/slides/slide5.xml><?xml version="1.0" encoding="utf-8"?>
+<p:sld xmlns:a="http://schemas.openxmlformats.org/drawingml/2006/main" xmlns:r="http://schemas.openxmlformats.org/officeDocument/2006/relationships" xmlns:p="http://schemas.openxmlformats.org/presentationml/2006/main">
+  <p:cSld>
+    <p:spTree>
+      <p:nvGrpSpPr>
+        <p:cNvPr id="1" name=""/>
+        <p:cNvGrpSpPr/>
+        <p:nvPr/>
+      </p:nvGrpSpPr>
+      <p:grpSpPr>
+        <a:xfrm>
+          <a:off x="0" y="0"/>
+          <a:ext cx="0" cy="0"/>
+          <a:chOff x="0" y="0"/>
+          <a:chExt cx="0" cy="0"/>
+        </a:xfrm>
+      </p:grpSpPr>
+      <p:sp>
+        <p:nvSpPr>
+          <p:cNvPr id="2" name="Title 1"/>
+          <p:cNvSpPr>
+            <a:spLocks noGrp="1"/>
+          </p:cNvSpPr>
+          <p:nvPr>
+            <p:ph type="title"/>
+          </p:nvPr>
+        </p:nvSpPr>
+        <p:spPr/>
+        <p:txBody>
+          <a:bodyPr/>
+          <a:lstStyle/>
+          <a:p>
+            <a:r>
+              <a:rPr lang="en-US" dirty="0" smtClean="0"/>
+              <a:t>Implementation (2)</a:t>
+            </a:r>
+            <a:endParaRPr lang="en-US" dirty="0"/>
+          </a:p>
+        </p:txBody>
+      </p:sp>
+      <p:pic>
+        <p:nvPicPr>
+          <p:cNvPr id="4" name="Content Placeholder 3"/>
+          <p:cNvPicPr>
+            <a:picLocks noGrp="1" noChangeAspect="1"/>
+          </p:cNvPicPr>
+          <p:nvPr>
+            <p:ph idx="1"/>
+          </p:nvPr>
+        </p:nvPicPr>
+        <p:blipFill rotWithShape="1">
+          <a:blip r:embed="rId2"/>
+          <a:srcRect l="29762" t="22885" r="49989" b="27920"/>
+          <a:stretch/>
+        </p:blipFill>
+        <p:spPr>
+          <a:xfrm>
+            <a:off x="3847926" y="1350665"/>
+            <a:ext cx="3918830" cy="5355734"/>
+          </a:xfrm>
+          <a:prstGeom prst="rect">
+            <a:avLst/>
+          </a:prstGeom>
+        </p:spPr>
+      </p:pic>
+      <p:sp>
+        <p:nvSpPr>
+          <p:cNvPr id="5" name="TextBox 4"/>
+          <p:cNvSpPr txBox="1"/>
+          <p:nvPr/>
+        </p:nvSpPr>
+        <p:spPr>
+          <a:xfrm>
+            <a:off x="1501422" y="1813467"/>
+            <a:ext cx="1813317" cy="369332"/>
+          </a:xfrm>
+          <a:prstGeom prst="rect">
+            <a:avLst/>
+          </a:prstGeom>
+          <a:noFill/>
+        </p:spPr>
+        <p:txBody>
+          <a:bodyPr wrap="none" rtlCol="0">
+            <a:spAutoFit/>
+          </a:bodyPr>
+          <a:lstStyle/>
+          <a:p>
+            <a:r>
+              <a:rPr lang="en-US" dirty="0" smtClean="0">
+                <a:solidFill>
+                  <a:schemeClr val="accent1"/>
+                </a:solidFill>
+              </a:rPr>
+              <a:t>Starting Method</a:t>
+            </a:r>
+            <a:endParaRPr lang="en-US" dirty="0">
+              <a:solidFill>
+                <a:schemeClr val="accent1"/>
+              </a:solidFill>
+            </a:endParaRPr>
+          </a:p>
+        </p:txBody>
+      </p:sp>
+      <p:sp>
+        <p:nvSpPr>
+          <p:cNvPr id="6" name="TextBox 5"/>
+          <p:cNvSpPr txBox="1"/>
+          <p:nvPr/>
+        </p:nvSpPr>
+        <p:spPr>
+          <a:xfrm>
+            <a:off x="1398829" y="4347822"/>
+            <a:ext cx="2018501" cy="369332"/>
+          </a:xfrm>
+          <a:prstGeom prst="rect">
+            <a:avLst/>
+          </a:prstGeom>
+          <a:noFill/>
+        </p:spPr>
+        <p:txBody>
+          <a:bodyPr wrap="none" rtlCol="0">
+            <a:spAutoFit/>
+          </a:bodyPr>
+          <a:lstStyle/>
+          <a:p>
+            <a:r>
+              <a:rPr lang="en-US" dirty="0" smtClean="0">
+                <a:solidFill>
+                  <a:schemeClr val="accent1"/>
+                </a:solidFill>
+              </a:rPr>
+              <a:t>Arranging Method</a:t>
+            </a:r>
+          </a:p>
+        </p:txBody>
+      </p:sp>
+    </p:spTree>
+    <p:extLst>
+      <p:ext uri="{BB962C8B-B14F-4D97-AF65-F5344CB8AC3E}">
+        <p14:creationId xmlns:p14="http://schemas.microsoft.com/office/powerpoint/2010/main" val="3943894947"/>
       </p:ext>
     </p:extLst>
   </p:cSld>

</xml_diff>